<commit_message>
new ppt & pdf
</commit_message>
<xml_diff>
--- a/presentation/presentation.pptx
+++ b/presentation/presentation.pptx
@@ -234,7 +234,7 @@
             <a:fld id="{35A36A6E-E9C2-465F-AFBE-66735C017D69}" type="datetimeFigureOut">
               <a:rPr lang="en-US" smtClean="0"/>
               <a:pPr/>
-              <a:t>9/22/2015</a:t>
+              <a:t>9/24/2015</a:t>
             </a:fld>
             <a:endParaRPr lang="en-GB"/>
           </a:p>
@@ -696,11 +696,7 @@
             </a:r>
             <a:r>
               <a:rPr lang="el-GR" b="0" baseline="0" dirty="0" smtClean="0"/>
-              <a:t>της </a:t>
-            </a:r>
-            <a:r>
-              <a:rPr lang="el-GR" b="0" baseline="0" dirty="0" smtClean="0"/>
-              <a:t>πλατφόρμας και το </a:t>
+              <a:t>της πλατφόρμας και το </a:t>
             </a:r>
             <a:r>
               <a:rPr lang="en-US" b="0" baseline="0" dirty="0" smtClean="0"/>
@@ -716,11 +712,7 @@
             </a:r>
             <a:r>
               <a:rPr lang="el-GR" b="0" baseline="0" dirty="0" smtClean="0"/>
-              <a:t>. </a:t>
-            </a:r>
-            <a:r>
-              <a:rPr lang="el-GR" b="0" baseline="0" dirty="0" smtClean="0"/>
-              <a:t>Η αρχιτεκτονική αυτή έχει τρία επίπεδα.</a:t>
+              <a:t>. Η αρχιτεκτονική αυτή έχει τρία επίπεδα.</a:t>
             </a:r>
           </a:p>
           <a:p>
@@ -766,15 +758,7 @@
           <a:p>
             <a:r>
               <a:rPr lang="el-GR" b="0" baseline="0" dirty="0" smtClean="0"/>
-              <a:t>Στο επίπεδο 2, όπου είναι το ενδιάμεσο επίπεδο, </a:t>
-            </a:r>
-            <a:r>
-              <a:rPr lang="el-GR" b="0" baseline="0" dirty="0" smtClean="0"/>
-              <a:t>πρόσθεσα ένα </a:t>
-            </a:r>
-            <a:r>
-              <a:rPr lang="el-GR" b="0" baseline="0" dirty="0" smtClean="0"/>
-              <a:t>ή περισσότερα </a:t>
+              <a:t>Στο επίπεδο 2, όπου είναι το ενδιάμεσο επίπεδο, πρόσθεσα ένα ή περισσότερα </a:t>
             </a:r>
             <a:r>
               <a:rPr lang="en-US" b="0" baseline="0" dirty="0" smtClean="0"/>
@@ -806,19 +790,7 @@
             </a:r>
             <a:r>
               <a:rPr lang="el-GR" b="0" baseline="0" dirty="0" smtClean="0"/>
-              <a:t> </a:t>
-            </a:r>
-            <a:r>
-              <a:rPr lang="el-GR" b="0" baseline="0" dirty="0" smtClean="0"/>
-              <a:t>και χρησιμοποιείται </a:t>
-            </a:r>
-            <a:r>
-              <a:rPr lang="el-GR" b="0" baseline="0" dirty="0" smtClean="0"/>
-              <a:t>από το σύστημα μας για να αποθηκεύει προσωρινή πληροφορία. </a:t>
-            </a:r>
-            <a:r>
-              <a:rPr lang="el-GR" b="0" baseline="0" dirty="0" smtClean="0"/>
-              <a:t>Έκανα </a:t>
+              <a:t> και χρησιμοποιείται από το σύστημα μας για να αποθηκεύει προσωρινή πληροφορία. Έκανα </a:t>
             </a:r>
             <a:r>
               <a:rPr lang="en-US" b="0" baseline="0" dirty="0" smtClean="0"/>
@@ -830,23 +802,11 @@
             </a:r>
             <a:r>
               <a:rPr lang="en-US" b="0" baseline="0" dirty="0" smtClean="0"/>
-              <a:t>Elgg </a:t>
-            </a:r>
-            <a:r>
-              <a:rPr lang="en-US" b="0" baseline="0" dirty="0" smtClean="0"/>
-              <a:t>SNE </a:t>
+              <a:t>Elgg SNE </a:t>
             </a:r>
             <a:r>
               <a:rPr lang="el-GR" b="0" baseline="0" dirty="0" smtClean="0"/>
-              <a:t>έτσι </a:t>
-            </a:r>
-            <a:r>
-              <a:rPr lang="el-GR" b="0" baseline="0" dirty="0" smtClean="0"/>
-              <a:t>ώστε να </a:t>
-            </a:r>
-            <a:r>
-              <a:rPr lang="el-GR" b="0" baseline="0" dirty="0" smtClean="0"/>
-              <a:t>υποστηρίζει μια τέτοια </a:t>
+              <a:t>έτσι ώστε να υποστηρίζει μια τέτοια </a:t>
             </a:r>
             <a:r>
               <a:rPr lang="en-US" b="0" baseline="0" dirty="0" smtClean="0"/>
@@ -856,7 +816,6 @@
               <a:rPr lang="el-GR" b="0" baseline="0" dirty="0" smtClean="0"/>
               <a:t>τεχνική.</a:t>
             </a:r>
-            <a:endParaRPr lang="el-GR" b="0" baseline="0" dirty="0" smtClean="0"/>
           </a:p>
           <a:p>
             <a:endParaRPr lang="el-GR" b="0" baseline="0" dirty="0" smtClean="0"/>
@@ -958,19 +917,11 @@
             </a:r>
             <a:r>
               <a:rPr lang="en-US" b="0" baseline="0" dirty="0" smtClean="0"/>
-              <a:t>Social Network </a:t>
-            </a:r>
-            <a:r>
-              <a:rPr lang="en-US" b="0" baseline="0" dirty="0" smtClean="0"/>
-              <a:t>Database</a:t>
+              <a:t>Social Network Database</a:t>
             </a:r>
             <a:r>
               <a:rPr lang="el-GR" b="0" baseline="0" dirty="0" smtClean="0"/>
-              <a:t> για να εξάγει την </a:t>
-            </a:r>
-            <a:r>
-              <a:rPr lang="el-GR" b="0" baseline="0" dirty="0" smtClean="0"/>
-              <a:t>πληροφορία που έχει σχέση με το </a:t>
+              <a:t> για να εξάγει την πληροφορία που έχει σχέση με το </a:t>
             </a:r>
             <a:r>
               <a:rPr lang="en-US" b="0" baseline="0" dirty="0" smtClean="0"/>
@@ -1136,7 +1087,7 @@
         <p:spPr/>
         <p:txBody>
           <a:bodyPr>
-            <a:normAutofit lnSpcReduction="10000"/>
+            <a:normAutofit fontScale="92500"/>
           </a:bodyPr>
           <a:lstStyle/>
           <a:p>
@@ -1171,11 +1122,7 @@
           <a:p>
             <a:r>
               <a:rPr lang="el-GR" baseline="0" dirty="0" smtClean="0"/>
-              <a:t>Ας πάρομε λοιπόν, </a:t>
-            </a:r>
-            <a:r>
-              <a:rPr lang="el-GR" baseline="0" dirty="0" smtClean="0"/>
-              <a:t>ένα χρήστη του ΚΔ ο οποίος κάνει ερωτήσεις σε κάποιο </a:t>
+              <a:t>Ας πάρομε λοιπόν, ένα χρήστη του ΚΔ ο οποίος κάνει ερωτήσεις σε κάποιο </a:t>
             </a:r>
             <a:r>
               <a:rPr lang="en-US" baseline="0" dirty="0" smtClean="0"/>
@@ -1239,11 +1186,7 @@
             </a:r>
             <a:r>
               <a:rPr lang="el-GR" baseline="0" dirty="0" smtClean="0"/>
-              <a:t> με κάποιες εξωτερικές ερωτήσεις. </a:t>
-            </a:r>
-            <a:r>
-              <a:rPr lang="el-GR" baseline="0" dirty="0" smtClean="0"/>
-              <a:t>Συνήθως οι προσεγγίσεις που κατηγοριοποιούν κείμενο, χρησιμοποιούν το λεγόμενο </a:t>
+              <a:t> με κάποιες εξωτερικές ερωτήσεις. Συνήθως οι προσεγγίσεις που κατηγοριοποιούν κείμενο, χρησιμοποιούν το λεγόμενο </a:t>
             </a:r>
             <a:r>
               <a:rPr lang="en-US" baseline="0" dirty="0" smtClean="0"/>
@@ -1261,11 +1204,7 @@
           <a:p>
             <a:r>
               <a:rPr lang="el-GR" baseline="0" dirty="0" smtClean="0"/>
-              <a:t>Έτσι η δύναμη του κοινωνικού δικτύου είναι </a:t>
-            </a:r>
-            <a:r>
-              <a:rPr lang="el-GR" baseline="0" dirty="0" smtClean="0"/>
-              <a:t>ότι επιτρέπει </a:t>
+              <a:t>Έτσι η δύναμη του κοινωνικού δικτύου είναι ότι επιτρέπει </a:t>
             </a:r>
             <a:r>
               <a:rPr lang="en-US" baseline="0" dirty="0" smtClean="0"/>
@@ -1281,19 +1220,7 @@
             </a:r>
             <a:r>
               <a:rPr lang="el-GR" baseline="0" dirty="0" smtClean="0"/>
-              <a:t>-απαντήσεις </a:t>
-            </a:r>
-            <a:r>
-              <a:rPr lang="el-GR" baseline="0" dirty="0" smtClean="0"/>
-              <a:t>και έτσι όπως είναι τα πράγματα σήμερα, κάποιος μπορεί να </a:t>
-            </a:r>
-            <a:r>
-              <a:rPr lang="el-GR" baseline="0" dirty="0" smtClean="0"/>
-              <a:t>ρωτήσει, </a:t>
-            </a:r>
-            <a:r>
-              <a:rPr lang="el-GR" baseline="0" dirty="0" smtClean="0"/>
-              <a:t>κάποιος μπορεί να απαντήσει αλλά εμείς έχουμε επιπλέον τα </a:t>
+              <a:t>-απαντήσεις και έτσι όπως είναι τα πράγματα σήμερα, κάποιος μπορεί να ρωτήσει, κάποιος μπορεί να απαντήσει αλλά εμείς έχουμε επιπλέον τα </a:t>
             </a:r>
             <a:r>
               <a:rPr lang="en-US" baseline="0" dirty="0" smtClean="0"/>
@@ -1310,15 +1237,7 @@
           <a:p>
             <a:r>
               <a:rPr lang="el-GR" baseline="0" dirty="0" smtClean="0"/>
-              <a:t>Το να </a:t>
-            </a:r>
-            <a:r>
-              <a:rPr lang="el-GR" baseline="0" dirty="0" smtClean="0"/>
-              <a:t>γράψει, όμως </a:t>
-            </a:r>
-            <a:r>
-              <a:rPr lang="el-GR" baseline="0" dirty="0" smtClean="0"/>
-              <a:t>ένας χρήστης ένα </a:t>
+              <a:t>Το να γράψει, όμως ένας χρήστης ένα </a:t>
             </a:r>
             <a:r>
               <a:rPr lang="en-US" baseline="0" dirty="0" smtClean="0"/>
@@ -1334,11 +1253,7 @@
             </a:r>
             <a:r>
               <a:rPr lang="el-GR" baseline="0" dirty="0" smtClean="0"/>
-              <a:t>να φτιάχνονται αυτόματα βάση της </a:t>
-            </a:r>
-            <a:r>
-              <a:rPr lang="el-GR" baseline="0" dirty="0" smtClean="0"/>
-              <a:t>ερώτησης Ή να βρίσκεται κάποια </a:t>
+              <a:t>να φτιάχνονται αυτόματα βάση της ερώτησης Ή να βρίσκεται κάποια </a:t>
             </a:r>
             <a:r>
               <a:rPr lang="en-US" baseline="0" dirty="0" smtClean="0"/>
@@ -1642,20 +1557,17 @@
             </a:r>
             <a:r>
               <a:rPr lang="en-US" dirty="0" smtClean="0"/>
-              <a:t>What</a:t>
-            </a:r>
-            <a:r>
-              <a:rPr lang="en-US" baseline="0" dirty="0" smtClean="0"/>
-              <a:t> is the best performant and lower cost deployment for </a:t>
-            </a:r>
-            <a:r>
-              <a:rPr lang="en-US" baseline="0" dirty="0" err="1" smtClean="0"/>
+              <a:t>Which deployments of </a:t>
+            </a:r>
+            <a:r>
+              <a:rPr lang="en-US" dirty="0" err="1" smtClean="0"/>
               <a:t>JEnterprise</a:t>
             </a:r>
             <a:r>
-              <a:rPr lang="en-US" baseline="0" dirty="0" smtClean="0"/>
-              <a:t> in a multi-cloud setup? </a:t>
-            </a:r>
+              <a:rPr lang="en-US" dirty="0" smtClean="0"/>
+              <a:t> provide the best performance for the lowest cost in a multi-cloud setup?</a:t>
+            </a:r>
+            <a:endParaRPr lang="en-US" baseline="0" dirty="0" smtClean="0"/>
           </a:p>
           <a:p>
             <a:endParaRPr lang="en-US" baseline="0" dirty="0" smtClean="0"/>
@@ -1772,7 +1684,7 @@
         <p:spPr/>
         <p:txBody>
           <a:bodyPr>
-            <a:normAutofit lnSpcReduction="10000"/>
+            <a:normAutofit/>
           </a:bodyPr>
           <a:lstStyle/>
           <a:p>
@@ -1812,23 +1724,11 @@
           <a:p>
             <a:r>
               <a:rPr lang="en-US" baseline="0" dirty="0" smtClean="0"/>
-              <a:t>To </a:t>
-            </a:r>
-            <a:r>
-              <a:rPr lang="en-US" baseline="0" dirty="0" smtClean="0"/>
-              <a:t>StackOverflow </a:t>
-            </a:r>
-            <a:r>
-              <a:rPr lang="en-US" baseline="0" dirty="0" smtClean="0"/>
-              <a:t>Community</a:t>
-            </a:r>
-            <a:r>
-              <a:rPr lang="el-GR" baseline="0" dirty="0" smtClean="0"/>
-              <a:t> </a:t>
-            </a:r>
-            <a:r>
-              <a:rPr lang="el-GR" baseline="0" dirty="0" smtClean="0"/>
-              <a:t>είναι ένα ΚΔ το οποίο περιέχει</a:t>
+              <a:t>To StackOverflow Community</a:t>
+            </a:r>
+            <a:r>
+              <a:rPr lang="el-GR" baseline="0" dirty="0" smtClean="0"/>
+              <a:t> είναι ένα ΚΔ το οποίο περιέχει</a:t>
             </a:r>
             <a:r>
               <a:rPr lang="en-US" baseline="0" dirty="0" smtClean="0"/>
@@ -2083,25 +1983,13 @@
           <a:p>
             <a:r>
               <a:rPr lang="el-GR" baseline="0" dirty="0" smtClean="0"/>
-              <a:t>Προχωρώντας λοιπόν</a:t>
-            </a:r>
-            <a:r>
-              <a:rPr lang="el-GR" baseline="0" dirty="0" smtClean="0"/>
-              <a:t>,</a:t>
-            </a:r>
-          </a:p>
-          <a:p>
-            <a:r>
-              <a:rPr lang="el-GR" baseline="0" dirty="0" smtClean="0"/>
-              <a:t>Ουσιαστικά, χρησιμοποιήσαμε </a:t>
-            </a:r>
-            <a:r>
-              <a:rPr lang="el-GR" baseline="0" dirty="0" smtClean="0"/>
-              <a:t>ένα εργαλείο, </a:t>
-            </a:r>
-            <a:r>
-              <a:rPr lang="el-GR" baseline="0" dirty="0" smtClean="0"/>
-              <a:t>το οποίο δέχεται πρώτα ένα σύνολο δεδομένων, το οποίο είναι χωρισμένο σε </a:t>
+              <a:t>Προχωρώντας λοιπόν,</a:t>
+            </a:r>
+          </a:p>
+          <a:p>
+            <a:r>
+              <a:rPr lang="el-GR" baseline="0" dirty="0" smtClean="0"/>
+              <a:t>Ουσιαστικά, χρησιμοποιήσαμε ένα εργαλείο, το οποίο δέχεται πρώτα ένα σύνολο δεδομένων, το οποίο είναι χωρισμένο σε </a:t>
             </a:r>
             <a:r>
               <a:rPr lang="en-US" baseline="0" dirty="0" smtClean="0"/>
@@ -2117,64 +2005,56 @@
             </a:r>
             <a:r>
               <a:rPr lang="el-GR" baseline="0" dirty="0" smtClean="0"/>
+              <a:t> ώστε να γίνει «</a:t>
+            </a:r>
+            <a:r>
+              <a:rPr lang="en-US" baseline="0" dirty="0" smtClean="0"/>
+              <a:t>train</a:t>
+            </a:r>
+            <a:r>
+              <a:rPr lang="el-GR" baseline="0" dirty="0" smtClean="0"/>
+              <a:t>»</a:t>
+            </a:r>
+            <a:r>
+              <a:rPr lang="en-US" baseline="0" dirty="0" smtClean="0"/>
               <a:t> </a:t>
             </a:r>
             <a:r>
               <a:rPr lang="el-GR" baseline="0" dirty="0" smtClean="0"/>
-              <a:t>ώστε να γίνει «</a:t>
-            </a:r>
-            <a:r>
-              <a:rPr lang="en-US" baseline="0" dirty="0" smtClean="0"/>
-              <a:t>train</a:t>
-            </a:r>
-            <a:r>
-              <a:rPr lang="el-GR" baseline="0" dirty="0" smtClean="0"/>
-              <a:t>»</a:t>
-            </a:r>
-            <a:r>
-              <a:rPr lang="en-US" baseline="0" dirty="0" smtClean="0"/>
+              <a:t>και στην συνέχεια μπορεί με μία πιθανότητα να προσδιορίσει ένα καινούριο </a:t>
+            </a:r>
+            <a:r>
+              <a:rPr lang="en-US" baseline="0" dirty="0" smtClean="0"/>
+              <a:t>input </a:t>
+            </a:r>
+            <a:r>
+              <a:rPr lang="el-GR" baseline="0" dirty="0" smtClean="0"/>
+              <a:t>σε ποια κλάση/κατηγορία ανήκει.</a:t>
+            </a:r>
+          </a:p>
+          <a:p>
+            <a:endParaRPr lang="el-GR" baseline="0" dirty="0" smtClean="0"/>
+          </a:p>
+          <a:p>
+            <a:r>
+              <a:rPr lang="el-GR" baseline="0" dirty="0" smtClean="0"/>
+              <a:t>Αυτό το εργαλείο είναι το </a:t>
+            </a:r>
+            <a:r>
+              <a:rPr lang="en-US" baseline="0" dirty="0" smtClean="0"/>
+              <a:t>NLP</a:t>
+            </a:r>
+            <a:r>
+              <a:rPr lang="el-GR" baseline="0" dirty="0" smtClean="0"/>
               <a:t> </a:t>
             </a:r>
             <a:r>
-              <a:rPr lang="el-GR" baseline="0" dirty="0" smtClean="0"/>
-              <a:t>και στην συνέχεια μπορεί με μία πιθανότητα να προσδιορίσει ένα καινούριο </a:t>
-            </a:r>
-            <a:r>
-              <a:rPr lang="en-US" baseline="0" dirty="0" smtClean="0"/>
-              <a:t>input </a:t>
-            </a:r>
-            <a:r>
-              <a:rPr lang="el-GR" baseline="0" dirty="0" smtClean="0"/>
-              <a:t>σε ποια κλάση/κατηγορία ανήκει.</a:t>
-            </a:r>
-          </a:p>
-          <a:p>
-            <a:endParaRPr lang="el-GR" baseline="0" dirty="0" smtClean="0"/>
-          </a:p>
-          <a:p>
-            <a:r>
-              <a:rPr lang="el-GR" baseline="0" dirty="0" smtClean="0"/>
-              <a:t>Αυτό το εργαλείο είναι το </a:t>
-            </a:r>
-            <a:r>
-              <a:rPr lang="en-US" baseline="0" dirty="0" smtClean="0"/>
-              <a:t>NLP</a:t>
-            </a:r>
-            <a:r>
-              <a:rPr lang="el-GR" baseline="0" dirty="0" smtClean="0"/>
-              <a:t> </a:t>
-            </a:r>
-            <a:r>
               <a:rPr lang="en-US" baseline="0" dirty="0" smtClean="0"/>
               <a:t>topic classification </a:t>
             </a:r>
             <a:r>
               <a:rPr lang="el-GR" baseline="0" dirty="0" smtClean="0"/>
-              <a:t>και χρησιμοποιήθηκε </a:t>
-            </a:r>
-            <a:r>
-              <a:rPr lang="el-GR" baseline="0" dirty="0" smtClean="0"/>
-              <a:t>ώστε να προσδιορίζεται η κατηγορία της ερώτησης που ανεβάζουν οι χρήστες στα </a:t>
+              <a:t>και χρησιμοποιήθηκε ώστε να προσδιορίζεται η κατηγορία της ερώτησης που ανεβάζουν οι χρήστες στα </a:t>
             </a:r>
             <a:r>
               <a:rPr lang="en-US" baseline="0" dirty="0" smtClean="0"/>
@@ -2182,11 +2062,7 @@
             </a:r>
             <a:r>
               <a:rPr lang="el-GR" baseline="0" dirty="0" smtClean="0"/>
-              <a:t>του </a:t>
-            </a:r>
-            <a:r>
-              <a:rPr lang="el-GR" baseline="0" dirty="0" smtClean="0"/>
-              <a:t>ΚΔ</a:t>
+              <a:t>του ΚΔ</a:t>
             </a:r>
             <a:r>
               <a:rPr lang="en-US" baseline="0" dirty="0" smtClean="0"/>
@@ -2450,11 +2326,7 @@
             </a:pPr>
             <a:r>
               <a:rPr lang="el-GR" baseline="0" dirty="0" smtClean="0"/>
-              <a:t>Λίγο </a:t>
-            </a:r>
-            <a:r>
-              <a:rPr lang="el-GR" baseline="0" dirty="0" smtClean="0"/>
-              <a:t>πιο συγκεκριμένα για το </a:t>
+              <a:t>Λίγο πιο συγκεκριμένα για το </a:t>
             </a:r>
             <a:r>
               <a:rPr lang="en-US" baseline="0" dirty="0" smtClean="0"/>
@@ -3025,11 +2897,7 @@
             </a:r>
             <a:r>
               <a:rPr lang="el-GR" baseline="0" dirty="0" smtClean="0"/>
-              <a:t> </a:t>
-            </a:r>
-            <a:r>
-              <a:rPr lang="el-GR" baseline="0" dirty="0" smtClean="0"/>
-              <a:t>εκτενής δουλειά στην οποία συμμετείχα…</a:t>
+              <a:t> εκτενής δουλειά στην οποία συμμετείχα…</a:t>
             </a:r>
             <a:endParaRPr lang="en-US" dirty="0" smtClean="0"/>
           </a:p>
@@ -3109,15 +2977,7 @@
           <a:p>
             <a:r>
               <a:rPr lang="el-GR" baseline="0" dirty="0" smtClean="0"/>
-              <a:t>Οι </a:t>
-            </a:r>
-            <a:r>
-              <a:rPr lang="el-GR" baseline="0" dirty="0" smtClean="0"/>
-              <a:t>χρήστες που έλαβαν μέρος στην αξιολόγηση </a:t>
-            </a:r>
-            <a:r>
-              <a:rPr lang="el-GR" baseline="0" dirty="0" smtClean="0"/>
-              <a:t>είχαν γνώση του τομέα των </a:t>
+              <a:t>Οι χρήστες που έλαβαν μέρος στην αξιολόγηση είχαν γνώση του τομέα των </a:t>
             </a:r>
             <a:r>
               <a:rPr lang="en-US" baseline="0" dirty="0" smtClean="0"/>
@@ -3184,11 +3044,7 @@
           <a:p>
             <a:r>
               <a:rPr lang="el-GR" baseline="0" dirty="0" smtClean="0"/>
-              <a:t>Οι </a:t>
-            </a:r>
-            <a:r>
-              <a:rPr lang="el-GR" baseline="0" dirty="0" smtClean="0"/>
-              <a:t>χρήστες αυτοί συμμετείχαν στην αξιολόγηση η οποία έγινε ως εξής</a:t>
+              <a:t>Οι χρήστες αυτοί συμμετείχαν στην αξιολόγηση η οποία έγινε ως εξής</a:t>
             </a:r>
             <a:endParaRPr lang="el-GR" dirty="0" smtClean="0"/>
           </a:p>
@@ -3369,7 +3225,7 @@
         <p:spPr/>
         <p:txBody>
           <a:bodyPr>
-            <a:normAutofit fontScale="92500"/>
+            <a:normAutofit/>
           </a:bodyPr>
           <a:lstStyle/>
           <a:p>
@@ -4833,11 +4689,7 @@
             </a:r>
             <a:r>
               <a:rPr lang="el-GR" b="0" baseline="0" dirty="0" smtClean="0"/>
-              <a:t>διαφορετικές </a:t>
-            </a:r>
-            <a:r>
-              <a:rPr lang="el-GR" b="0" baseline="0" dirty="0" smtClean="0"/>
-              <a:t>ερωτήσεις</a:t>
+              <a:t>διαφορετικές ερωτήσεις</a:t>
             </a:r>
             <a:r>
               <a:rPr lang="en-US" b="0" baseline="0" dirty="0" smtClean="0"/>
@@ -5616,31 +5468,7 @@
                 <a:ea typeface="+mn-ea"/>
                 <a:cs typeface="+mn-cs"/>
               </a:rPr>
-              <a:t>, περιπλανιούνται στο παγκόσμιο ιστό αναζητώντας </a:t>
-            </a:r>
-            <a:r>
-              <a:rPr lang="el-GR" sz="1200" kern="1200" dirty="0" smtClean="0">
-                <a:solidFill>
-                  <a:schemeClr val="tx1"/>
-                </a:solidFill>
-                <a:effectLst/>
-                <a:latin typeface="+mn-lt"/>
-                <a:ea typeface="+mn-ea"/>
-                <a:cs typeface="+mn-cs"/>
-              </a:rPr>
-              <a:t>αυτόματα </a:t>
-            </a:r>
-            <a:r>
-              <a:rPr lang="el-GR" sz="1200" kern="1200" dirty="0" smtClean="0">
-                <a:solidFill>
-                  <a:schemeClr val="tx1"/>
-                </a:solidFill>
-                <a:effectLst/>
-                <a:latin typeface="+mn-lt"/>
-                <a:ea typeface="+mn-ea"/>
-                <a:cs typeface="+mn-cs"/>
-              </a:rPr>
-              <a:t>εργαλεία όπως: το </a:t>
+              <a:t>, περιπλανιούνται στο παγκόσμιο ιστό αναζητώντας αυτόματα εργαλεία όπως: το </a:t>
             </a:r>
             <a:r>
               <a:rPr lang="en-US" sz="1200" kern="1200" dirty="0" smtClean="0">
@@ -6292,19 +6120,7 @@
                 <a:ea typeface="+mn-ea"/>
                 <a:cs typeface="+mn-cs"/>
               </a:rPr>
-              <a:t> </a:t>
-            </a:r>
-            <a:r>
-              <a:rPr lang="el-GR" sz="1200" kern="1200" baseline="0" dirty="0" smtClean="0">
-                <a:solidFill>
-                  <a:schemeClr val="tx1"/>
-                </a:solidFill>
-                <a:effectLst/>
-                <a:latin typeface="+mn-lt"/>
-                <a:ea typeface="+mn-ea"/>
-                <a:cs typeface="+mn-cs"/>
-              </a:rPr>
-              <a:t>θέμα είναι να μπορεί κάποιος να προσδιορίσει πόσο καλό είναι ένα </a:t>
+              <a:t> θέμα είναι να μπορεί κάποιος να προσδιορίσει πόσο καλό είναι ένα </a:t>
             </a:r>
             <a:r>
               <a:rPr lang="en-US" sz="1200" kern="1200" baseline="0" dirty="0" smtClean="0">
@@ -6352,31 +6168,7 @@
                 <a:ea typeface="+mn-ea"/>
                 <a:cs typeface="+mn-cs"/>
               </a:rPr>
-              <a:t>η οποία είναι μια βασική ερώτηση, </a:t>
-            </a:r>
-            <a:r>
-              <a:rPr lang="el-GR" sz="1200" kern="1200" baseline="0" dirty="0" smtClean="0">
-                <a:solidFill>
-                  <a:schemeClr val="tx1"/>
-                </a:solidFill>
-                <a:effectLst/>
-                <a:latin typeface="+mn-lt"/>
-                <a:ea typeface="+mn-ea"/>
-                <a:cs typeface="+mn-cs"/>
-              </a:rPr>
-              <a:t>δηλαδή </a:t>
-            </a:r>
-            <a:r>
-              <a:rPr lang="el-GR" sz="1200" kern="1200" baseline="0" dirty="0" smtClean="0">
-                <a:solidFill>
-                  <a:schemeClr val="tx1"/>
-                </a:solidFill>
-                <a:effectLst/>
-                <a:latin typeface="+mn-lt"/>
-                <a:ea typeface="+mn-ea"/>
-                <a:cs typeface="+mn-cs"/>
-              </a:rPr>
-              <a:t>πόσο καλό είναι το</a:t>
+              <a:t>η οποία είναι μια βασική ερώτηση, δηλαδή πόσο καλό είναι το</a:t>
             </a:r>
             <a:r>
               <a:rPr lang="en-US" sz="1200" kern="1200" baseline="0" dirty="0" smtClean="0">
@@ -6651,31 +6443,7 @@
                 <a:ea typeface="+mn-ea"/>
                 <a:cs typeface="+mn-cs"/>
               </a:rPr>
-              <a:t>η </a:t>
-            </a:r>
-            <a:r>
-              <a:rPr lang="el-GR" sz="1200" kern="1200" baseline="0" dirty="0" smtClean="0">
-                <a:solidFill>
-                  <a:schemeClr val="tx1"/>
-                </a:solidFill>
-                <a:effectLst/>
-                <a:latin typeface="+mn-lt"/>
-                <a:ea typeface="+mn-ea"/>
-                <a:cs typeface="+mn-cs"/>
-              </a:rPr>
-              <a:t>οποία </a:t>
-            </a:r>
-            <a:r>
-              <a:rPr lang="el-GR" sz="1200" kern="1200" baseline="0" dirty="0" smtClean="0">
-                <a:solidFill>
-                  <a:schemeClr val="tx1"/>
-                </a:solidFill>
-                <a:effectLst/>
-                <a:latin typeface="+mn-lt"/>
-                <a:ea typeface="+mn-ea"/>
-                <a:cs typeface="+mn-cs"/>
-              </a:rPr>
-              <a:t>είναι μια καινούρια γλώσσα από το </a:t>
+              <a:t>η οποία είναι μια καινούρια γλώσσα από το </a:t>
             </a:r>
             <a:r>
               <a:rPr lang="en-US" sz="1200" kern="1200" baseline="0" dirty="0" smtClean="0">
@@ -6827,19 +6595,7 @@
                 <a:ea typeface="+mn-ea"/>
                 <a:cs typeface="+mn-cs"/>
               </a:rPr>
-              <a:t> πρόβλημα με αυτά τα εργαλεία </a:t>
-            </a:r>
-            <a:r>
-              <a:rPr lang="el-GR" sz="1200" kern="1200" baseline="0" dirty="0" smtClean="0">
-                <a:solidFill>
-                  <a:schemeClr val="tx1"/>
-                </a:solidFill>
-                <a:effectLst/>
-                <a:latin typeface="+mn-lt"/>
-                <a:ea typeface="+mn-ea"/>
-                <a:cs typeface="+mn-cs"/>
-              </a:rPr>
-              <a:t>που αναφέραμε, όπως το </a:t>
+              <a:t> πρόβλημα με αυτά τα εργαλεία που αναφέραμε, όπως το </a:t>
             </a:r>
             <a:r>
               <a:rPr lang="en-US" sz="1200" kern="1200" baseline="0" dirty="0" smtClean="0">
@@ -6863,19 +6619,7 @@
                 <a:ea typeface="+mn-ea"/>
                 <a:cs typeface="+mn-cs"/>
               </a:rPr>
-              <a:t>είναι </a:t>
-            </a:r>
-            <a:r>
-              <a:rPr lang="el-GR" sz="1200" kern="1200" baseline="0" dirty="0" smtClean="0">
-                <a:solidFill>
-                  <a:schemeClr val="tx1"/>
-                </a:solidFill>
-                <a:effectLst/>
-                <a:latin typeface="+mn-lt"/>
-                <a:ea typeface="+mn-ea"/>
-                <a:cs typeface="+mn-cs"/>
-              </a:rPr>
-              <a:t>ότι οι </a:t>
+              <a:t>είναι ότι οι </a:t>
             </a:r>
             <a:r>
               <a:rPr lang="en-US" sz="1200" kern="1200" baseline="0" dirty="0" smtClean="0">
@@ -7154,11 +6898,7 @@
             </a:r>
             <a:r>
               <a:rPr lang="el-GR" baseline="0" dirty="0" smtClean="0"/>
-              <a:t>χρήστες τους κάποιες διευκολύνσεις αλλά λείπει από την περιοχή ένα σύστημα το οποίο να φέρνει στους τελικούς χρήστες τους όλη την πληροφορία που χρειάζονται για μια εφαρμογή καθώς επίσης και μια κοινότητα χρηστών η οποία να τους βοηθάει και να απαντάει ερωτήσεις τους</a:t>
-            </a:r>
-            <a:r>
-              <a:rPr lang="el-GR" baseline="0" dirty="0" smtClean="0"/>
-              <a:t>. Οπότε</a:t>
+              <a:t>χρήστες τους κάποιες διευκολύνσεις αλλά λείπει από την περιοχή ένα σύστημα το οποίο να φέρνει στους τελικούς χρήστες τους όλη την πληροφορία που χρειάζονται για μια εφαρμογή καθώς επίσης και μια κοινότητα χρηστών η οποία να τους βοηθάει και να απαντάει ερωτήσεις τους. Οπότε</a:t>
             </a:r>
             <a:r>
               <a:rPr lang="en-US" baseline="0" dirty="0" smtClean="0"/>
@@ -7251,7 +6991,7 @@
         <p:spPr/>
         <p:txBody>
           <a:bodyPr>
-            <a:normAutofit lnSpcReduction="10000"/>
+            <a:normAutofit fontScale="92500" lnSpcReduction="10000"/>
           </a:bodyPr>
           <a:lstStyle/>
           <a:p>
@@ -8208,7 +7948,7 @@
         <p:spPr/>
         <p:txBody>
           <a:bodyPr>
-            <a:normAutofit lnSpcReduction="10000"/>
+            <a:normAutofit fontScale="92500"/>
           </a:bodyPr>
           <a:lstStyle/>
           <a:p>
@@ -8227,11 +7967,7 @@
           <a:p>
             <a:r>
               <a:rPr lang="el-GR" b="0" dirty="0" smtClean="0"/>
-              <a:t>Εδώ </a:t>
-            </a:r>
-            <a:r>
-              <a:rPr lang="el-GR" b="0" dirty="0" smtClean="0"/>
-              <a:t>παρουσιάζονται τα </a:t>
+              <a:t>Εδώ παρουσιάζονται τα </a:t>
             </a:r>
             <a:r>
               <a:rPr lang="en-US" b="0" dirty="0" smtClean="0"/>
@@ -8434,17 +8170,12 @@
             </a:r>
             <a:r>
               <a:rPr lang="en-US" b="0" dirty="0" smtClean="0"/>
-              <a:t>Service Level Agreements of web </a:t>
-            </a:r>
-            <a:r>
-              <a:rPr lang="en-US" b="0" dirty="0" smtClean="0"/>
-              <a:t>services</a:t>
+              <a:t>Service Level Agreements of web services</a:t>
             </a:r>
             <a:r>
               <a:rPr lang="el-GR" b="0" dirty="0" smtClean="0"/>
               <a:t>.</a:t>
             </a:r>
-            <a:endParaRPr lang="el-GR" b="0" dirty="0" smtClean="0"/>
           </a:p>
           <a:p>
             <a:r>
@@ -8453,11 +8184,7 @@
             </a:r>
             <a:r>
               <a:rPr lang="en-US" b="0" dirty="0" smtClean="0"/>
-              <a:t>Scalability </a:t>
-            </a:r>
-            <a:r>
-              <a:rPr lang="en-US" b="0" dirty="0" smtClean="0"/>
-              <a:t>Rules Language (SRL), </a:t>
+              <a:t>Scalability Rules Language (SRL), </a:t>
             </a:r>
             <a:r>
               <a:rPr lang="el-GR" b="0" dirty="0" smtClean="0"/>
@@ -8491,19 +8218,11 @@
             </a:r>
             <a:r>
               <a:rPr lang="en-US" b="0" dirty="0" smtClean="0"/>
-              <a:t>Historical </a:t>
-            </a:r>
-            <a:r>
-              <a:rPr lang="en-US" b="0" dirty="0" smtClean="0"/>
-              <a:t>Execution</a:t>
+              <a:t>Historical Execution</a:t>
             </a:r>
             <a:r>
               <a:rPr lang="en-US" b="0" baseline="0" dirty="0" smtClean="0"/>
-              <a:t> </a:t>
-            </a:r>
-            <a:r>
-              <a:rPr lang="en-US" b="0" baseline="0" dirty="0" smtClean="0"/>
-              <a:t>Data</a:t>
+              <a:t> Data</a:t>
             </a:r>
             <a:r>
               <a:rPr lang="el-GR" b="0" baseline="0" dirty="0" smtClean="0"/>
@@ -8533,11 +8252,7 @@
             </a:r>
             <a:r>
               <a:rPr lang="el-GR" b="0" baseline="0" dirty="0" smtClean="0"/>
-              <a:t> </a:t>
-            </a:r>
-            <a:r>
-              <a:rPr lang="el-GR" b="0" baseline="0" dirty="0" smtClean="0"/>
-              <a:t>…..</a:t>
+              <a:t> …..</a:t>
             </a:r>
           </a:p>
           <a:p>
@@ -8578,7 +8293,24 @@
             </a:r>
             <a:r>
               <a:rPr lang="el-GR" b="0" baseline="0" dirty="0" smtClean="0"/>
-              <a:t>μορφή.</a:t>
+              <a:t>μορφή</a:t>
+            </a:r>
+            <a:r>
+              <a:rPr lang="el-GR" b="0" baseline="0" dirty="0" smtClean="0"/>
+              <a:t>.</a:t>
+            </a:r>
+            <a:endParaRPr lang="en-US" b="0" baseline="0" dirty="0" smtClean="0"/>
+          </a:p>
+          <a:p>
+            <a:r>
+              <a:rPr lang="en-US" b="0" baseline="0" dirty="0" smtClean="0"/>
+              <a:t>Cloud ML -&gt; deployment model</a:t>
+            </a:r>
+          </a:p>
+          <a:p>
+            <a:r>
+              <a:rPr lang="en-US" b="0" baseline="0" dirty="0" smtClean="0"/>
+              <a:t>Cloud Providers -&gt; provider model</a:t>
             </a:r>
             <a:endParaRPr lang="en-US" b="0" dirty="0" smtClean="0"/>
           </a:p>
@@ -8684,11 +8416,7 @@
             </a:pPr>
             <a:r>
               <a:rPr lang="el-GR" b="0" baseline="0" dirty="0" smtClean="0"/>
-              <a:t>Το </a:t>
-            </a:r>
-            <a:r>
-              <a:rPr lang="el-GR" b="0" baseline="0" dirty="0" smtClean="0"/>
-              <a:t>δικό μου </a:t>
+              <a:t>Το δικό μου </a:t>
             </a:r>
             <a:r>
               <a:rPr lang="en-US" b="0" baseline="0" dirty="0" smtClean="0"/>
@@ -8704,23 +8432,7 @@
             </a:r>
             <a:r>
               <a:rPr lang="el-GR" b="0" baseline="0" dirty="0" smtClean="0"/>
-              <a:t>είναι </a:t>
-            </a:r>
-            <a:r>
-              <a:rPr lang="el-GR" b="0" baseline="0" dirty="0" smtClean="0"/>
-              <a:t>στο </a:t>
-            </a:r>
-            <a:r>
-              <a:rPr lang="el-GR" b="0" baseline="0" dirty="0" smtClean="0"/>
-              <a:t>κοινωνικό </a:t>
-            </a:r>
-            <a:r>
-              <a:rPr lang="el-GR" b="0" baseline="0" dirty="0" smtClean="0"/>
-              <a:t>δίκτυο</a:t>
-            </a:r>
-            <a:r>
-              <a:rPr lang="el-GR" b="0" baseline="0" dirty="0" smtClean="0"/>
-              <a:t>, όπου πήρα ένα υπάρχον σύστημα, Το </a:t>
+              <a:t>είναι στο κοινωνικό δίκτυο, όπου πήρα ένα υπάρχον σύστημα, Το </a:t>
             </a:r>
             <a:r>
               <a:rPr lang="en-US" b="0" baseline="0" dirty="0" smtClean="0"/>
@@ -9056,7 +8768,7 @@
             <a:fld id="{28F388FD-1349-4B74-B173-DEE231C45C9C}" type="datetime1">
               <a:rPr lang="en-US" smtClean="0"/>
               <a:pPr/>
-              <a:t>9/22/2015</a:t>
+              <a:t>9/24/2015</a:t>
             </a:fld>
             <a:endParaRPr lang="en-GB"/>
           </a:p>
@@ -9421,7 +9133,7 @@
             <a:fld id="{3C3A84A0-F2B7-46E0-9A1A-F54034D8EDBD}" type="datetime1">
               <a:rPr lang="en-US" smtClean="0"/>
               <a:pPr/>
-              <a:t>9/22/2015</a:t>
+              <a:t>9/24/2015</a:t>
             </a:fld>
             <a:endParaRPr lang="en-GB"/>
           </a:p>
@@ -9602,7 +9314,7 @@
             <a:fld id="{3E229035-3E06-4894-B0D5-FF6762DFC127}" type="datetime1">
               <a:rPr lang="en-US" smtClean="0"/>
               <a:pPr/>
-              <a:t>9/22/2015</a:t>
+              <a:t>9/24/2015</a:t>
             </a:fld>
             <a:endParaRPr lang="en-GB"/>
           </a:p>
@@ -9843,7 +9555,7 @@
             <a:fld id="{939D8CAB-AFAD-44F9-99B3-90A20D6DB4EE}" type="datetime1">
               <a:rPr lang="en-US" smtClean="0"/>
               <a:pPr/>
-              <a:t>9/22/2015</a:t>
+              <a:t>9/24/2015</a:t>
             </a:fld>
             <a:endParaRPr lang="en-GB"/>
           </a:p>
@@ -10118,7 +9830,7 @@
             <a:fld id="{D09FA660-D8B8-480E-80AE-E310B47D050A}" type="datetime1">
               <a:rPr lang="en-US" smtClean="0"/>
               <a:pPr/>
-              <a:t>9/22/2015</a:t>
+              <a:t>9/24/2015</a:t>
             </a:fld>
             <a:endParaRPr lang="en-GB"/>
           </a:p>
@@ -10344,7 +10056,7 @@
             <a:fld id="{428B1FCA-1F40-4707-9D4A-FC8C39D751AE}" type="datetime1">
               <a:rPr lang="en-US" smtClean="0"/>
               <a:pPr/>
-              <a:t>9/22/2015</a:t>
+              <a:t>9/24/2015</a:t>
             </a:fld>
             <a:endParaRPr lang="en-GB"/>
           </a:p>
@@ -10702,7 +10414,7 @@
             <a:fld id="{E29A0755-12E0-421D-A13C-381344A3C6C0}" type="datetime1">
               <a:rPr lang="en-US" smtClean="0"/>
               <a:pPr/>
-              <a:t>9/22/2015</a:t>
+              <a:t>9/24/2015</a:t>
             </a:fld>
             <a:endParaRPr lang="en-GB"/>
           </a:p>
@@ -10940,7 +10652,7 @@
             <a:fld id="{744C634E-EE12-4137-B0D4-C332E4335954}" type="datetime1">
               <a:rPr lang="en-US" smtClean="0"/>
               <a:pPr/>
-              <a:t>9/22/2015</a:t>
+              <a:t>9/24/2015</a:t>
             </a:fld>
             <a:endParaRPr lang="en-GB"/>
           </a:p>
@@ -11086,7 +10798,7 @@
             <a:fld id="{AD93D238-AA6B-4D3E-814E-9A3817EBE5A1}" type="datetime1">
               <a:rPr lang="en-US" smtClean="0"/>
               <a:pPr/>
-              <a:t>9/22/2015</a:t>
+              <a:t>9/24/2015</a:t>
             </a:fld>
             <a:endParaRPr lang="en-GB"/>
           </a:p>
@@ -11369,7 +11081,7 @@
             <a:fld id="{D6E12A9E-544D-4743-9F0B-884E2BF7D0B0}" type="datetime1">
               <a:rPr lang="en-US" smtClean="0"/>
               <a:pPr/>
-              <a:t>9/22/2015</a:t>
+              <a:t>9/24/2015</a:t>
             </a:fld>
             <a:endParaRPr lang="en-GB"/>
           </a:p>
@@ -11782,7 +11494,7 @@
             <a:fld id="{0EAE2EAB-07B8-4942-9591-287BBAF1E385}" type="datetime1">
               <a:rPr lang="en-US" smtClean="0"/>
               <a:pPr/>
-              <a:t>9/22/2015</a:t>
+              <a:t>9/24/2015</a:t>
             </a:fld>
             <a:endParaRPr lang="en-GB"/>
           </a:p>
@@ -12126,7 +11838,7 @@
             <a:fld id="{BABEAD1A-BFE9-4884-9063-04C5BBC12657}" type="datetime1">
               <a:rPr lang="en-US" smtClean="0"/>
               <a:pPr/>
-              <a:t>9/22/2015</a:t>
+              <a:t>9/24/2015</a:t>
             </a:fld>
             <a:endParaRPr lang="en-GB"/>
           </a:p>
@@ -13913,6 +13625,75 @@
           </a:p>
         </p:txBody>
       </p:sp>
+      <p:pic>
+        <p:nvPicPr>
+          <p:cNvPr id="10" name="Picture 9"/>
+          <p:cNvPicPr>
+            <a:picLocks noChangeAspect="1"/>
+          </p:cNvPicPr>
+          <p:nvPr/>
+        </p:nvPicPr>
+        <p:blipFill>
+          <a:blip r:embed="rId4">
+            <a:extLst>
+              <a:ext uri="{28A0092B-C50C-407E-A947-70E740481C1C}">
+                <a14:useLocalDpi xmlns:a14="http://schemas.microsoft.com/office/drawing/2010/main" val="0"/>
+              </a:ext>
+            </a:extLst>
+          </a:blip>
+          <a:stretch>
+            <a:fillRect/>
+          </a:stretch>
+        </p:blipFill>
+        <p:spPr>
+          <a:xfrm>
+            <a:off x="323528" y="1855624"/>
+            <a:ext cx="8229600" cy="3039249"/>
+          </a:xfrm>
+          <a:prstGeom prst="rect">
+            <a:avLst/>
+          </a:prstGeom>
+        </p:spPr>
+      </p:pic>
+      <p:sp>
+        <p:nvSpPr>
+          <p:cNvPr id="11" name="Rectangle 10"/>
+          <p:cNvSpPr/>
+          <p:nvPr/>
+        </p:nvSpPr>
+        <p:spPr>
+          <a:xfrm>
+            <a:off x="2843808" y="2636912"/>
+            <a:ext cx="1980000" cy="190907"/>
+          </a:xfrm>
+          <a:prstGeom prst="rect">
+            <a:avLst/>
+          </a:prstGeom>
+          <a:noFill/>
+        </p:spPr>
+        <p:style>
+          <a:lnRef idx="2">
+            <a:schemeClr val="accent6"/>
+          </a:lnRef>
+          <a:fillRef idx="1">
+            <a:schemeClr val="lt1"/>
+          </a:fillRef>
+          <a:effectRef idx="0">
+            <a:schemeClr val="accent6"/>
+          </a:effectRef>
+          <a:fontRef idx="minor">
+            <a:schemeClr val="dk1"/>
+          </a:fontRef>
+        </p:style>
+        <p:txBody>
+          <a:bodyPr rtlCol="0" anchor="ctr"/>
+          <a:lstStyle/>
+          <a:p>
+            <a:pPr algn="ctr"/>
+            <a:endParaRPr lang="el-GR"/>
+          </a:p>
+        </p:txBody>
+      </p:sp>
     </p:spTree>
     <p:extLst>
       <p:ext uri="{BB962C8B-B14F-4D97-AF65-F5344CB8AC3E}">
@@ -14054,6 +13835,112 @@
                       </p:childTnLst>
                     </p:cTn>
                   </p:par>
+                  <p:par>
+                    <p:cTn id="14" fill="hold">
+                      <p:stCondLst>
+                        <p:cond delay="indefinite"/>
+                      </p:stCondLst>
+                      <p:childTnLst>
+                        <p:par>
+                          <p:cTn id="15" fill="hold">
+                            <p:stCondLst>
+                              <p:cond delay="0"/>
+                            </p:stCondLst>
+                            <p:childTnLst>
+                              <p:par>
+                                <p:cTn id="16" presetID="6" presetClass="entr" presetSubtype="16" fill="hold" nodeType="clickEffect">
+                                  <p:stCondLst>
+                                    <p:cond delay="0"/>
+                                  </p:stCondLst>
+                                  <p:childTnLst>
+                                    <p:set>
+                                      <p:cBhvr>
+                                        <p:cTn id="17" dur="1" fill="hold">
+                                          <p:stCondLst>
+                                            <p:cond delay="0"/>
+                                          </p:stCondLst>
+                                        </p:cTn>
+                                        <p:tgtEl>
+                                          <p:spTgt spid="10"/>
+                                        </p:tgtEl>
+                                        <p:attrNameLst>
+                                          <p:attrName>style.visibility</p:attrName>
+                                        </p:attrNameLst>
+                                      </p:cBhvr>
+                                      <p:to>
+                                        <p:strVal val="visible"/>
+                                      </p:to>
+                                    </p:set>
+                                    <p:animEffect transition="in" filter="circle(in)">
+                                      <p:cBhvr>
+                                        <p:cTn id="18" dur="2000"/>
+                                        <p:tgtEl>
+                                          <p:spTgt spid="10"/>
+                                        </p:tgtEl>
+                                      </p:cBhvr>
+                                    </p:animEffect>
+                                  </p:childTnLst>
+                                </p:cTn>
+                              </p:par>
+                            </p:childTnLst>
+                          </p:cTn>
+                        </p:par>
+                      </p:childTnLst>
+                    </p:cTn>
+                  </p:par>
+                  <p:par>
+                    <p:cTn id="19" fill="hold">
+                      <p:stCondLst>
+                        <p:cond delay="indefinite"/>
+                      </p:stCondLst>
+                      <p:childTnLst>
+                        <p:par>
+                          <p:cTn id="20" fill="hold">
+                            <p:stCondLst>
+                              <p:cond delay="0"/>
+                            </p:stCondLst>
+                            <p:childTnLst>
+                              <p:par>
+                                <p:cTn id="21" presetID="10" presetClass="entr" presetSubtype="0" fill="hold" grpId="0" nodeType="clickEffect">
+                                  <p:stCondLst>
+                                    <p:cond delay="0"/>
+                                  </p:stCondLst>
+                                  <p:childTnLst>
+                                    <p:set>
+                                      <p:cBhvr>
+                                        <p:cTn id="22" dur="1" fill="hold">
+                                          <p:stCondLst>
+                                            <p:cond delay="0"/>
+                                          </p:stCondLst>
+                                        </p:cTn>
+                                        <p:tgtEl>
+                                          <p:spTgt spid="11"/>
+                                        </p:tgtEl>
+                                        <p:attrNameLst>
+                                          <p:attrName>style.visibility</p:attrName>
+                                        </p:attrNameLst>
+                                      </p:cBhvr>
+                                      <p:to>
+                                        <p:strVal val="visible"/>
+                                      </p:to>
+                                    </p:set>
+                                    <p:animEffect transition="in" filter="fade">
+                                      <p:cBhvr>
+                                        <p:cTn id="23" dur="500"/>
+                                        <p:tgtEl>
+                                          <p:spTgt spid="11"/>
+                                        </p:tgtEl>
+                                      </p:cBhvr>
+                                    </p:animEffect>
+                                  </p:childTnLst>
+                                </p:cTn>
+                              </p:par>
+                            </p:childTnLst>
+                          </p:cTn>
+                        </p:par>
+                      </p:childTnLst>
+                    </p:cTn>
+                  </p:par>
                 </p:childTnLst>
               </p:cTn>
               <p:prevCondLst>
@@ -14079,6 +13966,7 @@
       <p:bldP spid="5" grpId="0" animBg="1"/>
       <p:bldP spid="7" grpId="0" animBg="1"/>
       <p:bldP spid="8" grpId="0" animBg="1"/>
+      <p:bldP spid="11" grpId="0" animBg="1"/>
     </p:bldLst>
   </p:timing>
 </p:sld>
@@ -14285,11 +14173,7 @@
           <a:p>
             <a:r>
               <a:rPr lang="en-US" dirty="0" smtClean="0"/>
-              <a:t>Topic </a:t>
-            </a:r>
-            <a:r>
-              <a:rPr lang="en-US" dirty="0" smtClean="0"/>
-              <a:t>Classification (1/2)</a:t>
+              <a:t>Topic Classification (1/2)</a:t>
             </a:r>
             <a:endParaRPr lang="el-GR" dirty="0"/>
           </a:p>
@@ -14431,11 +14315,7 @@
           <a:p>
             <a:r>
               <a:rPr lang="en-US" dirty="0" smtClean="0"/>
-              <a:t>Topic </a:t>
-            </a:r>
-            <a:r>
-              <a:rPr lang="en-US" dirty="0" smtClean="0"/>
-              <a:t>Classification (2/2)</a:t>
+              <a:t>Topic Classification (2/2)</a:t>
             </a:r>
             <a:endParaRPr lang="el-GR" dirty="0"/>
           </a:p>
@@ -14873,7 +14753,6 @@
               <a:rPr lang="en-US" dirty="0" smtClean="0"/>
               <a:t>Focusing on User Interface</a:t>
             </a:r>
-            <a:endParaRPr lang="en-US" dirty="0" smtClean="0"/>
           </a:p>
           <a:p>
             <a:r>
@@ -14978,11 +14857,7 @@
           <a:p>
             <a:r>
               <a:rPr lang="en-US" dirty="0" smtClean="0"/>
-              <a:t>Users’ </a:t>
-            </a:r>
-            <a:r>
-              <a:rPr lang="en-US" dirty="0" smtClean="0"/>
-              <a:t>Feedback</a:t>
+              <a:t>Users’ Feedback</a:t>
             </a:r>
             <a:endParaRPr lang="el-GR" dirty="0"/>
           </a:p>
@@ -15337,15 +15212,7 @@
           <a:p>
             <a:r>
               <a:rPr lang="en-GB" dirty="0" smtClean="0"/>
-              <a:t>Design </a:t>
-            </a:r>
-            <a:r>
-              <a:rPr lang="en-GB" dirty="0" smtClean="0"/>
-              <a:t>and </a:t>
-            </a:r>
-            <a:r>
-              <a:rPr lang="en-GB" dirty="0" smtClean="0"/>
-              <a:t>Implementation</a:t>
+              <a:t>Design and Implementation</a:t>
             </a:r>
             <a:endParaRPr lang="en-GB" sz="2000" dirty="0" smtClean="0"/>
           </a:p>
@@ -18454,13 +18321,8 @@
             <a:pPr lvl="1"/>
             <a:r>
               <a:rPr lang="en-US" dirty="0" smtClean="0"/>
-              <a:t>Extensive </a:t>
-            </a:r>
-            <a:r>
-              <a:rPr lang="en-US" dirty="0" smtClean="0"/>
-              <a:t>user evaluation</a:t>
-            </a:r>
-            <a:endParaRPr lang="en-US" dirty="0" smtClean="0"/>
+              <a:t>Extensive user evaluation</a:t>
+            </a:r>
           </a:p>
           <a:p>
             <a:pPr lvl="1"/>
@@ -19580,11 +19442,7 @@
             </a:r>
             <a:r>
               <a:rPr lang="en-US" dirty="0" smtClean="0"/>
-              <a:t>ngineering </a:t>
-            </a:r>
-            <a:r>
-              <a:rPr lang="en-US" dirty="0" smtClean="0"/>
-              <a:t>Aspects</a:t>
+              <a:t>ngineering Aspects</a:t>
             </a:r>
             <a:endParaRPr lang="en-GB" dirty="0"/>
           </a:p>

</xml_diff>

<commit_message>
pass first tree pages
</commit_message>
<xml_diff>
--- a/presentation/presentation.pptx
+++ b/presentation/presentation.pptx
@@ -147,6 +147,9 @@
         </p15:guide>
       </p15:sldGuideLst>
     </p:ext>
+    <p:ext uri="{2D200454-40CA-4A62-9FC3-DE9A4176ACB9}">
+      <p15:notesGuideLst xmlns:p15="http://schemas.microsoft.com/office/powerpoint/2012/main"/>
+    </p:ext>
   </p:extLst>
 </p:presentation>
 </file>
@@ -234,7 +237,7 @@
             <a:fld id="{35A36A6E-E9C2-465F-AFBE-66735C017D69}" type="datetimeFigureOut">
               <a:rPr lang="en-US" smtClean="0"/>
               <a:pPr/>
-              <a:t>9/26/2015</a:t>
+              <a:t>9/27/2015</a:t>
             </a:fld>
             <a:endParaRPr lang="en-GB"/>
           </a:p>
@@ -1261,13 +1264,8 @@
             </a:r>
             <a:r>
               <a:rPr lang="el-GR" baseline="0" dirty="0" smtClean="0"/>
-              <a:t>απάντηση πάνω στο ίδιο θέμα</a:t>
-            </a:r>
-            <a:r>
-              <a:rPr lang="el-GR" baseline="0" dirty="0" smtClean="0"/>
-              <a:t>. </a:t>
-            </a:r>
-            <a:endParaRPr lang="el-GR" baseline="0" dirty="0" smtClean="0"/>
+              <a:t>απάντηση πάνω στο ίδιο θέμα. </a:t>
+            </a:r>
           </a:p>
         </p:txBody>
       </p:sp>
@@ -1472,11 +1470,7 @@
             </a:r>
             <a:r>
               <a:rPr lang="en-US" baseline="0" dirty="0" smtClean="0"/>
-              <a:t>cost </a:t>
-            </a:r>
-            <a:r>
-              <a:rPr lang="en-US" baseline="0" dirty="0" smtClean="0"/>
-              <a:t>effective</a:t>
+              <a:t>cost effective</a:t>
             </a:r>
             <a:r>
               <a:rPr lang="el-GR" baseline="0" dirty="0" smtClean="0"/>
@@ -1517,19 +1511,7 @@
           <a:p>
             <a:r>
               <a:rPr lang="el-GR" baseline="0" dirty="0" smtClean="0"/>
-              <a:t>Όμως αυτή την περίπτωση δεν την έχουμε γενικεύσει. Κάποιος </a:t>
-            </a:r>
-            <a:r>
-              <a:rPr lang="el-GR" baseline="0" dirty="0" smtClean="0"/>
-              <a:t>θα μπορούσε να κοιτάξει έναν </a:t>
-            </a:r>
-            <a:r>
-              <a:rPr lang="el-GR" baseline="0" dirty="0" smtClean="0"/>
-              <a:t>αυτόματο μηχανικό </a:t>
-            </a:r>
-            <a:r>
-              <a:rPr lang="el-GR" baseline="0" dirty="0" smtClean="0"/>
-              <a:t>σχηματισμό των </a:t>
+              <a:t>Όμως αυτή την περίπτωση δεν την έχουμε γενικεύσει. Κάποιος θα μπορούσε να κοιτάξει έναν αυτόματο μηχανικό σχηματισμό των </a:t>
             </a:r>
             <a:r>
               <a:rPr lang="en-US" baseline="0" dirty="0" smtClean="0"/>
@@ -1537,11 +1519,7 @@
             </a:r>
             <a:r>
               <a:rPr lang="el-GR" baseline="0" dirty="0" smtClean="0"/>
-              <a:t>Αυτό είναι ένα ενδιαφέρον πρόβλημα, αλλά αυτό από μόνο του ξεφεύγει από τα όρια της δικής μου εργασίας και θα ήταν μια καλή μελλοντική δουλειά. </a:t>
-            </a:r>
-            <a:r>
-              <a:rPr lang="el-GR" baseline="0" dirty="0" smtClean="0"/>
-              <a:t>Εφόσον έχουμε το μηχανισμό να κάνουμε </a:t>
+              <a:t>Αυτό είναι ένα ενδιαφέρον πρόβλημα, αλλά αυτό από μόνο του ξεφεύγει από τα όρια της δικής μου εργασίας και θα ήταν μια καλή μελλοντική δουλειά. Εφόσον έχουμε το μηχανισμό να κάνουμε </a:t>
             </a:r>
             <a:r>
               <a:rPr lang="en-US" baseline="0" dirty="0" smtClean="0"/>
@@ -1573,11 +1551,7 @@
             </a:r>
             <a:r>
               <a:rPr lang="el-GR" baseline="0" dirty="0" smtClean="0"/>
-              <a:t>και το σύστημα από μόνο του μετά να εμφανίζει αυτή την </a:t>
-            </a:r>
-            <a:r>
-              <a:rPr lang="el-GR" baseline="0" dirty="0" smtClean="0"/>
-              <a:t>απάντηση και σε άλλες σχετικές ερωτήσεις. </a:t>
+              <a:t>και το σύστημα από μόνο του μετά να εμφανίζει αυτή την απάντηση και σε άλλες σχετικές ερωτήσεις. </a:t>
             </a:r>
             <a:endParaRPr lang="en-US" baseline="0" dirty="0" smtClean="0"/>
           </a:p>
@@ -1591,19 +1565,7 @@
             </a:r>
             <a:r>
               <a:rPr lang="el-GR" baseline="0" dirty="0" smtClean="0"/>
-              <a:t> </a:t>
-            </a:r>
-            <a:r>
-              <a:rPr lang="el-GR" baseline="0" dirty="0" smtClean="0"/>
-              <a:t>έρθει </a:t>
-            </a:r>
-            <a:r>
-              <a:rPr lang="el-GR" baseline="0" dirty="0" smtClean="0"/>
-              <a:t>μια </a:t>
-            </a:r>
-            <a:r>
-              <a:rPr lang="el-GR" baseline="0" dirty="0" smtClean="0"/>
-              <a:t>σχετική ερώτηση όπως αυτή που λέει ακριβώς το ίδιο πράγμα διαφορετικά εκφρασμένο, τότε μπορούμε να επωφεληθούμε γιατί η προηγούμενη απάντηση χρησιμοποιείτε και εδώ</a:t>
+              <a:t> έρθει μια σχετική ερώτηση όπως αυτή που λέει ακριβώς το ίδιο πράγμα διαφορετικά εκφρασμένο, τότε μπορούμε να επωφεληθούμε γιατί η προηγούμενη απάντηση χρησιμοποιείτε και εδώ</a:t>
             </a:r>
             <a:endParaRPr lang="en-US" baseline="0" dirty="0" smtClean="0"/>
           </a:p>
@@ -1702,7 +1664,7 @@
         <p:spPr/>
         <p:txBody>
           <a:bodyPr>
-            <a:normAutofit fontScale="47500" lnSpcReduction="20000"/>
+            <a:normAutofit fontScale="55000" lnSpcReduction="20000"/>
           </a:bodyPr>
           <a:lstStyle/>
           <a:p>
@@ -1718,11 +1680,7 @@
           <a:p>
             <a:r>
               <a:rPr lang="en-US" baseline="0" dirty="0" smtClean="0"/>
-              <a:t>To </a:t>
-            </a:r>
-            <a:r>
-              <a:rPr lang="en-US" baseline="0" dirty="0" smtClean="0"/>
-              <a:t>StackOverflow Community</a:t>
+              <a:t>To StackOverflow Community</a:t>
             </a:r>
             <a:r>
               <a:rPr lang="el-GR" baseline="0" dirty="0" smtClean="0"/>
@@ -1773,7 +1731,11 @@
             </a:pPr>
             <a:r>
               <a:rPr lang="el-GR" baseline="0" dirty="0" smtClean="0"/>
-              <a:t> Οι χρήστες του </a:t>
+              <a:t> </a:t>
+            </a:r>
+            <a:r>
+              <a:rPr lang="el-GR" baseline="0" dirty="0" smtClean="0"/>
+              <a:t>Οι χρήστες του </a:t>
             </a:r>
             <a:r>
               <a:rPr lang="en-US" baseline="0" dirty="0" smtClean="0"/>
@@ -1817,19 +1779,7 @@
           <a:p>
             <a:r>
               <a:rPr lang="el-GR" baseline="0" dirty="0" smtClean="0"/>
-              <a:t>Έτσι </a:t>
-            </a:r>
-            <a:r>
-              <a:rPr lang="el-GR" baseline="0" dirty="0" smtClean="0"/>
-              <a:t>χρησιμοποιήσαμε </a:t>
-            </a:r>
-            <a:r>
-              <a:rPr lang="el-GR" baseline="0" dirty="0" smtClean="0"/>
-              <a:t>ερωτήσεις </a:t>
-            </a:r>
-            <a:r>
-              <a:rPr lang="el-GR" baseline="0" dirty="0" smtClean="0"/>
-              <a:t>με σχετικά</a:t>
+              <a:t>Έτσι χρησιμοποιήσαμε ερωτήσεις με σχετικά</a:t>
             </a:r>
             <a:r>
               <a:rPr lang="en-US" baseline="0" dirty="0" smtClean="0"/>
@@ -1837,11 +1787,7 @@
             </a:r>
             <a:r>
               <a:rPr lang="el-GR" baseline="0" dirty="0" smtClean="0"/>
-              <a:t>στο </a:t>
-            </a:r>
-            <a:r>
-              <a:rPr lang="el-GR" baseline="0" dirty="0" smtClean="0"/>
-              <a:t>δικό μας δίκτυο.</a:t>
+              <a:t>στο δικό μας δίκτυο.</a:t>
             </a:r>
           </a:p>
           <a:p>
@@ -2054,27 +2000,7 @@
           <a:p>
             <a:r>
               <a:rPr lang="el-GR" baseline="0" dirty="0" smtClean="0"/>
-              <a:t>Ουσιαστικά, </a:t>
-            </a:r>
-            <a:r>
-              <a:rPr lang="el-GR" baseline="0" dirty="0" smtClean="0"/>
-              <a:t>το </a:t>
-            </a:r>
-            <a:r>
-              <a:rPr lang="el-GR" baseline="0" dirty="0" smtClean="0"/>
-              <a:t>σύνολο αυτών των δεδομένων</a:t>
-            </a:r>
-            <a:r>
-              <a:rPr lang="el-GR" baseline="0" dirty="0" smtClean="0"/>
-              <a:t>, το οποίο είναι χωρισμένο σε </a:t>
-            </a:r>
-            <a:r>
-              <a:rPr lang="el-GR" baseline="0" dirty="0" smtClean="0"/>
-              <a:t>κατηγορίες </a:t>
-            </a:r>
-            <a:r>
-              <a:rPr lang="el-GR" baseline="0" dirty="0" smtClean="0"/>
-              <a:t>χρησιμοποιώντας τα </a:t>
+              <a:t>Ουσιαστικά, το σύνολο αυτών των δεδομένων, το οποίο είναι χωρισμένο σε κατηγορίες χρησιμοποιώντας τα </a:t>
             </a:r>
             <a:r>
               <a:rPr lang="en-US" baseline="0" dirty="0" smtClean="0"/>
@@ -2085,16 +2011,12 @@
               <a:t> </a:t>
             </a:r>
             <a:r>
-              <a:rPr lang="el-GR" baseline="0" dirty="0" err="1" smtClean="0"/>
-              <a:t>χρησιμοιήθηκε</a:t>
-            </a:r>
-            <a:r>
-              <a:rPr lang="el-GR" baseline="0" dirty="0" smtClean="0"/>
-              <a:t> ώστε </a:t>
-            </a:r>
-            <a:r>
-              <a:rPr lang="el-GR" baseline="0" dirty="0" smtClean="0"/>
-              <a:t>να γίνει «</a:t>
+              <a:rPr lang="el-GR" baseline="0" dirty="0" smtClean="0"/>
+              <a:t>χρησιμοποιήθηκε </a:t>
+            </a:r>
+            <a:r>
+              <a:rPr lang="el-GR" baseline="0" dirty="0" smtClean="0"/>
+              <a:t>ώστε να γίνει «</a:t>
             </a:r>
             <a:r>
               <a:rPr lang="en-US" baseline="0" dirty="0" smtClean="0"/>
@@ -2118,11 +2040,7 @@
             </a:r>
             <a:r>
               <a:rPr lang="el-GR" baseline="0" dirty="0" smtClean="0"/>
-              <a:t>μας και </a:t>
-            </a:r>
-            <a:r>
-              <a:rPr lang="el-GR" baseline="0" dirty="0" smtClean="0"/>
-              <a:t>στην συνέχεια μπορεί με μία πιθανότητα να προσδιορίσει ένα καινούριο </a:t>
+              <a:t>μας και στην συνέχεια μπορεί με μία πιθανότητα να προσδιορίσει ένα καινούριο </a:t>
             </a:r>
             <a:r>
               <a:rPr lang="en-US" baseline="0" dirty="0" smtClean="0"/>
@@ -2292,11 +2210,6 @@
               <a:rPr lang="el-GR" baseline="0" dirty="0" smtClean="0"/>
               <a:t>.</a:t>
             </a:r>
-          </a:p>
-          <a:p>
-            <a:endParaRPr lang="el-GR" baseline="0" dirty="0" smtClean="0"/>
-          </a:p>
-          <a:p>
             <a:endParaRPr lang="el-GR" baseline="0" dirty="0" smtClean="0"/>
           </a:p>
           <a:p>
@@ -2508,11 +2421,7 @@
             </a:r>
             <a:r>
               <a:rPr lang="el-GR" baseline="0" dirty="0" smtClean="0"/>
-              <a:t>έχει ως εξής: Στην αρχή παρέχουμε στον </a:t>
-            </a:r>
-            <a:r>
-              <a:rPr lang="en-US" baseline="0" dirty="0" smtClean="0"/>
-              <a:t>NLPC, </a:t>
+              <a:t>έχει ως εξής: Στην αρχή παρέχουμε </a:t>
             </a:r>
             <a:r>
               <a:rPr lang="el-GR" baseline="0" dirty="0" smtClean="0"/>
@@ -2524,7 +2433,11 @@
             </a:r>
             <a:r>
               <a:rPr lang="el-GR" baseline="0" dirty="0" smtClean="0"/>
-              <a:t>τα οποία όμως ξέρουμε σε ποια κατηγορία ανήκουν. Συγκεκριμένα στο παράδειγμα εδώ, δίνουμε στον </a:t>
+              <a:t>τα οποία όμως ξέρουμε σε ποια κατηγορία ανήκουν. Συγκεκριμένα στο παράδειγμα εδώ, δίνουμε </a:t>
+            </a:r>
+            <a:r>
+              <a:rPr lang="el-GR" baseline="0" dirty="0" smtClean="0"/>
+              <a:t>στον </a:t>
             </a:r>
             <a:r>
               <a:rPr lang="en-US" baseline="0" dirty="0" smtClean="0"/>
@@ -3598,15 +3511,7 @@
           <a:p>
             <a:r>
               <a:rPr lang="el-GR" baseline="0" dirty="0" smtClean="0"/>
-              <a:t>Θα ξεκινήσουμε </a:t>
-            </a:r>
-            <a:r>
-              <a:rPr lang="el-GR" baseline="0" dirty="0" smtClean="0"/>
-              <a:t>τα κίνητρα που μας οδήγησαν σε αυτή την εργασία, </a:t>
-            </a:r>
-            <a:r>
-              <a:rPr lang="el-GR" baseline="0" dirty="0" smtClean="0"/>
-              <a:t>μετά θα μιλήσουμε για το </a:t>
+              <a:t>Θα ξεκινήσουμε τα κίνητρα που μας οδήγησαν σε αυτή την εργασία, μετά θα μιλήσουμε για το </a:t>
             </a:r>
             <a:r>
               <a:rPr lang="en-US" baseline="0" dirty="0" smtClean="0"/>
@@ -3622,23 +3527,7 @@
             </a:r>
             <a:r>
               <a:rPr lang="el-GR" baseline="0" dirty="0" smtClean="0"/>
-              <a:t>της ΠΚΔ και </a:t>
-            </a:r>
-            <a:r>
-              <a:rPr lang="el-GR" baseline="0" dirty="0" smtClean="0"/>
-              <a:t>στο τέλος της παρουσίαση </a:t>
-            </a:r>
-            <a:r>
-              <a:rPr lang="el-GR" baseline="0" dirty="0" smtClean="0"/>
-              <a:t>θα </a:t>
-            </a:r>
-            <a:r>
-              <a:rPr lang="el-GR" baseline="0" dirty="0" smtClean="0"/>
-              <a:t>συζητήσουμε για </a:t>
-            </a:r>
-            <a:r>
-              <a:rPr lang="el-GR" baseline="0" dirty="0" smtClean="0"/>
-              <a:t>την αξιολόγηση του ΚΔ.</a:t>
+              <a:t>της ΠΚΔ και στο τέλος της παρουσίαση θα συζητήσουμε για την αξιολόγηση του ΚΔ.</a:t>
             </a:r>
             <a:endParaRPr lang="en-US" dirty="0" smtClean="0"/>
           </a:p>
@@ -5096,11 +4985,7 @@
             </a:r>
             <a:r>
               <a:rPr lang="el-GR" baseline="0" dirty="0" smtClean="0"/>
-              <a:t> με </a:t>
-            </a:r>
-            <a:r>
-              <a:rPr lang="el-GR" baseline="0" dirty="0" smtClean="0"/>
-              <a:t>το </a:t>
+              <a:t> με το </a:t>
             </a:r>
             <a:r>
               <a:rPr lang="en-US" baseline="0" dirty="0" smtClean="0"/>
@@ -5198,7 +5083,7 @@
         </p:spPr>
         <p:txBody>
           <a:bodyPr>
-            <a:normAutofit fontScale="85000" lnSpcReduction="20000"/>
+            <a:normAutofit fontScale="70000" lnSpcReduction="20000"/>
           </a:bodyPr>
           <a:lstStyle/>
           <a:p>
@@ -5882,7 +5767,7 @@
         <p:spPr/>
         <p:txBody>
           <a:bodyPr>
-            <a:normAutofit fontScale="92500" lnSpcReduction="10000"/>
+            <a:normAutofit fontScale="92500" lnSpcReduction="20000"/>
           </a:bodyPr>
           <a:lstStyle/>
           <a:p>
@@ -6067,11 +5952,7 @@
             </a:r>
             <a:r>
               <a:rPr lang="el-GR" sz="600" dirty="0"/>
-              <a:t>. </a:t>
-            </a:r>
-            <a:r>
-              <a:rPr lang="el-GR" sz="600" dirty="0"/>
-              <a:t>Το οποίο είναι </a:t>
+              <a:t>. Το οποίο είναι </a:t>
             </a:r>
             <a:r>
               <a:rPr lang="el-GR" sz="600" dirty="0" smtClean="0"/>
@@ -6674,11 +6555,7 @@
             </a:r>
             <a:r>
               <a:rPr lang="el-GR" b="0" baseline="0" dirty="0" smtClean="0"/>
-              <a:t> </a:t>
-            </a:r>
-            <a:r>
-              <a:rPr lang="el-GR" b="0" baseline="0" dirty="0" smtClean="0"/>
-              <a:t>στόχοι της εφαρμογής.</a:t>
+              <a:t> στόχοι της εφαρμογής.</a:t>
             </a:r>
           </a:p>
           <a:p>
@@ -6807,11 +6684,7 @@
             </a:r>
             <a:r>
               <a:rPr lang="en-US" b="0" baseline="0" dirty="0" smtClean="0"/>
-              <a:t>tree </a:t>
-            </a:r>
-            <a:r>
-              <a:rPr lang="en-US" b="0" baseline="0" dirty="0" smtClean="0"/>
-              <a:t>editor </a:t>
+              <a:t>tree editor </a:t>
             </a:r>
             <a:r>
               <a:rPr lang="el-GR" b="0" baseline="0" dirty="0" smtClean="0"/>
@@ -6823,11 +6696,7 @@
             </a:r>
             <a:r>
               <a:rPr lang="el-GR" b="0" baseline="0" dirty="0" smtClean="0"/>
-              <a:t>Όταν </a:t>
-            </a:r>
-            <a:r>
-              <a:rPr lang="el-GR" b="0" baseline="0" dirty="0" smtClean="0"/>
-              <a:t>κάποιος πατήσει εδώ μέσα βλέπει και άλλη πληροφορία που λίγο πολύ αυτό αντιστοιχεί στο παζλ που σας έδειξα πριν. Πίσω από τον </a:t>
+              <a:t>Όταν κάποιος πατήσει εδώ μέσα βλέπει και άλλη πληροφορία που λίγο πολύ αυτό αντιστοιχεί στο παζλ που σας έδειξα πριν. Πίσω από τον </a:t>
             </a:r>
             <a:r>
               <a:rPr lang="en-US" b="0" baseline="0" dirty="0" smtClean="0"/>
@@ -7302,7 +7171,7 @@
             <a:fld id="{28F388FD-1349-4B74-B173-DEE231C45C9C}" type="datetime1">
               <a:rPr lang="en-US" smtClean="0"/>
               <a:pPr/>
-              <a:t>9/26/2015</a:t>
+              <a:t>9/27/2015</a:t>
             </a:fld>
             <a:endParaRPr lang="en-GB"/>
           </a:p>
@@ -7667,7 +7536,7 @@
             <a:fld id="{3C3A84A0-F2B7-46E0-9A1A-F54034D8EDBD}" type="datetime1">
               <a:rPr lang="en-US" smtClean="0"/>
               <a:pPr/>
-              <a:t>9/26/2015</a:t>
+              <a:t>9/27/2015</a:t>
             </a:fld>
             <a:endParaRPr lang="en-GB"/>
           </a:p>
@@ -7848,7 +7717,7 @@
             <a:fld id="{3E229035-3E06-4894-B0D5-FF6762DFC127}" type="datetime1">
               <a:rPr lang="en-US" smtClean="0"/>
               <a:pPr/>
-              <a:t>9/26/2015</a:t>
+              <a:t>9/27/2015</a:t>
             </a:fld>
             <a:endParaRPr lang="en-GB"/>
           </a:p>
@@ -8089,7 +7958,7 @@
             <a:fld id="{939D8CAB-AFAD-44F9-99B3-90A20D6DB4EE}" type="datetime1">
               <a:rPr lang="en-US" smtClean="0"/>
               <a:pPr/>
-              <a:t>9/26/2015</a:t>
+              <a:t>9/27/2015</a:t>
             </a:fld>
             <a:endParaRPr lang="en-GB"/>
           </a:p>
@@ -8364,7 +8233,7 @@
             <a:fld id="{D09FA660-D8B8-480E-80AE-E310B47D050A}" type="datetime1">
               <a:rPr lang="en-US" smtClean="0"/>
               <a:pPr/>
-              <a:t>9/26/2015</a:t>
+              <a:t>9/27/2015</a:t>
             </a:fld>
             <a:endParaRPr lang="en-GB"/>
           </a:p>
@@ -8590,7 +8459,7 @@
             <a:fld id="{428B1FCA-1F40-4707-9D4A-FC8C39D751AE}" type="datetime1">
               <a:rPr lang="en-US" smtClean="0"/>
               <a:pPr/>
-              <a:t>9/26/2015</a:t>
+              <a:t>9/27/2015</a:t>
             </a:fld>
             <a:endParaRPr lang="en-GB"/>
           </a:p>
@@ -8948,7 +8817,7 @@
             <a:fld id="{E29A0755-12E0-421D-A13C-381344A3C6C0}" type="datetime1">
               <a:rPr lang="en-US" smtClean="0"/>
               <a:pPr/>
-              <a:t>9/26/2015</a:t>
+              <a:t>9/27/2015</a:t>
             </a:fld>
             <a:endParaRPr lang="en-GB"/>
           </a:p>
@@ -9186,7 +9055,7 @@
             <a:fld id="{744C634E-EE12-4137-B0D4-C332E4335954}" type="datetime1">
               <a:rPr lang="en-US" smtClean="0"/>
               <a:pPr/>
-              <a:t>9/26/2015</a:t>
+              <a:t>9/27/2015</a:t>
             </a:fld>
             <a:endParaRPr lang="en-GB"/>
           </a:p>
@@ -9332,7 +9201,7 @@
             <a:fld id="{AD93D238-AA6B-4D3E-814E-9A3817EBE5A1}" type="datetime1">
               <a:rPr lang="en-US" smtClean="0"/>
               <a:pPr/>
-              <a:t>9/26/2015</a:t>
+              <a:t>9/27/2015</a:t>
             </a:fld>
             <a:endParaRPr lang="en-GB"/>
           </a:p>
@@ -9615,7 +9484,7 @@
             <a:fld id="{D6E12A9E-544D-4743-9F0B-884E2BF7D0B0}" type="datetime1">
               <a:rPr lang="en-US" smtClean="0"/>
               <a:pPr/>
-              <a:t>9/26/2015</a:t>
+              <a:t>9/27/2015</a:t>
             </a:fld>
             <a:endParaRPr lang="en-GB"/>
           </a:p>
@@ -10028,7 +9897,7 @@
             <a:fld id="{0EAE2EAB-07B8-4942-9591-287BBAF1E385}" type="datetime1">
               <a:rPr lang="en-US" smtClean="0"/>
               <a:pPr/>
-              <a:t>9/26/2015</a:t>
+              <a:t>9/27/2015</a:t>
             </a:fld>
             <a:endParaRPr lang="en-GB"/>
           </a:p>
@@ -10372,7 +10241,7 @@
             <a:fld id="{BABEAD1A-BFE9-4884-9063-04C5BBC12657}" type="datetime1">
               <a:rPr lang="en-US" smtClean="0"/>
               <a:pPr/>
-              <a:t>9/26/2015</a:t>
+              <a:t>9/27/2015</a:t>
             </a:fld>
             <a:endParaRPr lang="en-GB"/>
           </a:p>
@@ -11064,11 +10933,7 @@
           <a:p>
             <a:r>
               <a:rPr lang="en-US" dirty="0" smtClean="0"/>
-              <a:t>System </a:t>
-            </a:r>
-            <a:r>
-              <a:rPr lang="en-US" dirty="0" smtClean="0"/>
-              <a:t>Architecture</a:t>
+              <a:t>System Architecture</a:t>
             </a:r>
             <a:endParaRPr lang="el-GR" dirty="0"/>
           </a:p>
@@ -11803,7 +11668,7 @@
                                           </p:stCondLst>
                                         </p:cTn>
                                         <p:tgtEl>
-                                          <p:spTgt spid="13"/>
+                                          <p:spTgt spid="5"/>
                                         </p:tgtEl>
                                         <p:attrNameLst>
                                           <p:attrName>style.visibility</p:attrName>
@@ -11817,7 +11682,7 @@
                                       <p:cBhvr>
                                         <p:cTn id="35" dur="500"/>
                                         <p:tgtEl>
-                                          <p:spTgt spid="13"/>
+                                          <p:spTgt spid="5"/>
                                         </p:tgtEl>
                                       </p:cBhvr>
                                     </p:animEffect>
@@ -11856,7 +11721,7 @@
                                           </p:stCondLst>
                                         </p:cTn>
                                         <p:tgtEl>
-                                          <p:spTgt spid="5"/>
+                                          <p:spTgt spid="13"/>
                                         </p:tgtEl>
                                         <p:attrNameLst>
                                           <p:attrName>style.visibility</p:attrName>
@@ -11870,7 +11735,7 @@
                                       <p:cBhvr>
                                         <p:cTn id="40" dur="500"/>
                                         <p:tgtEl>
-                                          <p:spTgt spid="5"/>
+                                          <p:spTgt spid="13"/>
                                         </p:tgtEl>
                                       </p:cBhvr>
                                     </p:animEffect>
@@ -14025,6 +13890,7 @@
               <a:rPr lang="en-US" dirty="0" smtClean="0"/>
               <a:t>Motivation</a:t>
             </a:r>
+            <a:endParaRPr lang="en-US" dirty="0" smtClean="0"/>
           </a:p>
           <a:p>
             <a:r>
@@ -14100,11 +13966,7 @@
             </a:r>
             <a:r>
               <a:rPr lang="en-US" dirty="0" smtClean="0"/>
-              <a:t>ime</a:t>
-            </a:r>
-            <a:r>
-              <a:rPr lang="en-US" dirty="0" smtClean="0"/>
-              <a:t>, adding </a:t>
+              <a:t>ime, adding </a:t>
             </a:r>
             <a:r>
               <a:rPr lang="en-US" dirty="0" err="1" smtClean="0"/>
@@ -15620,15 +15482,7 @@
           <a:p>
             <a:r>
               <a:rPr lang="en-US" dirty="0" smtClean="0"/>
-              <a:t>Response </a:t>
-            </a:r>
-            <a:r>
-              <a:rPr lang="en-US" dirty="0" smtClean="0"/>
-              <a:t>time</a:t>
-            </a:r>
-            <a:r>
-              <a:rPr lang="en-US" dirty="0" smtClean="0"/>
-              <a:t>, adding SNE (2/2)</a:t>
+              <a:t>Response time, adding SNE (2/2)</a:t>
             </a:r>
             <a:endParaRPr lang="el-GR" dirty="0"/>
           </a:p>
@@ -15767,11 +15621,7 @@
           <a:p>
             <a:r>
               <a:rPr lang="en-US" dirty="0" smtClean="0"/>
-              <a:t>CPU </a:t>
-            </a:r>
-            <a:r>
-              <a:rPr lang="en-US" dirty="0" smtClean="0"/>
-              <a:t>utilization</a:t>
+              <a:t>CPU utilization</a:t>
             </a:r>
             <a:r>
               <a:rPr lang="en-US" dirty="0"/>
@@ -16220,11 +16070,7 @@
             </a:r>
             <a:r>
               <a:rPr lang="en-US" dirty="0" smtClean="0"/>
-              <a:t>utilization</a:t>
-            </a:r>
-            <a:r>
-              <a:rPr lang="en-US" dirty="0" smtClean="0"/>
-              <a:t>, adding SNE (2/2</a:t>
+              <a:t>utilization, adding SNE (2/2</a:t>
             </a:r>
             <a:r>
               <a:rPr lang="en-US" dirty="0"/>

</xml_diff>